<commit_message>
updated jb and ppt
</commit_message>
<xml_diff>
--- a/day 3-5 -python basics/python_basics_slides.pptx
+++ b/day 3-5 -python basics/python_basics_slides.pptx
@@ -346,7 +346,7 @@
           <a:p>
             <a:fld id="{1D8BD707-D9CF-40AE-B4C6-C98DA3205C09}" type="datetimeFigureOut">
               <a:rPr lang="en-US"/>
-              <a:t>8/2/24</a:t>
+              <a:t>8/5/24</a:t>
             </a:fld>
             <a:endParaRPr lang="en-US"/>
           </a:p>
@@ -523,7 +523,7 @@
           <a:p>
             <a:fld id="{1D8BD707-D9CF-40AE-B4C6-C98DA3205C09}" type="datetimeFigureOut">
               <a:rPr lang="en-US"/>
-              <a:t>8/2/24</a:t>
+              <a:t>8/5/24</a:t>
             </a:fld>
             <a:endParaRPr lang="en-US"/>
           </a:p>
@@ -749,7 +749,7 @@
           <a:p>
             <a:fld id="{1D8BD707-D9CF-40AE-B4C6-C98DA3205C09}" type="datetimeFigureOut">
               <a:rPr lang="en-US"/>
-              <a:t>8/2/24</a:t>
+              <a:t>8/5/24</a:t>
             </a:fld>
             <a:endParaRPr lang="en-US"/>
           </a:p>
@@ -897,7 +897,7 @@
           <a:p>
             <a:fld id="{1D8BD707-D9CF-40AE-B4C6-C98DA3205C09}" type="datetimeFigureOut">
               <a:rPr lang="en-US"/>
-              <a:t>8/2/24</a:t>
+              <a:t>8/5/24</a:t>
             </a:fld>
             <a:endParaRPr lang="en-US"/>
           </a:p>
@@ -1016,7 +1016,7 @@
           <a:p>
             <a:fld id="{1D8BD707-D9CF-40AE-B4C6-C98DA3205C09}" type="datetimeFigureOut">
               <a:rPr lang="en-US"/>
-              <a:t>8/2/24</a:t>
+              <a:t>8/5/24</a:t>
             </a:fld>
             <a:endParaRPr lang="en-US"/>
           </a:p>
@@ -1294,7 +1294,7 @@
           <a:p>
             <a:fld id="{1D8BD707-D9CF-40AE-B4C6-C98DA3205C09}" type="datetimeFigureOut">
               <a:rPr lang="en-US"/>
-              <a:t>8/2/24</a:t>
+              <a:t>8/5/24</a:t>
             </a:fld>
             <a:endParaRPr lang="en-US"/>
           </a:p>
@@ -23655,6 +23655,16 @@
               </a:tabLst>
             </a:pPr>
             <a:r>
+              <a:rPr sz="2400" spc="-145" dirty="0" err="1">
+                <a:solidFill>
+                  <a:srgbClr val="2E75B6"/>
+                </a:solidFill>
+                <a:latin typeface="Trebuchet MS"/>
+                <a:cs typeface="Trebuchet MS"/>
+              </a:rPr>
+              <a:t>elif</a:t>
+            </a:r>
+            <a:r>
               <a:rPr sz="2400" spc="-145" dirty="0">
                 <a:solidFill>
                   <a:srgbClr val="2E75B6"/>
@@ -23662,57 +23672,47 @@
                 <a:latin typeface="Trebuchet MS"/>
                 <a:cs typeface="Trebuchet MS"/>
               </a:rPr>
-              <a:t>elif </a:t>
-            </a:r>
-            <a:r>
-              <a:rPr sz="2400" spc="-155" dirty="0">
+              <a:t> </a:t>
+            </a:r>
+            <a:r>
+              <a:rPr sz="2400" spc="-65" dirty="0">
                 <a:solidFill>
                   <a:srgbClr val="2E75B6"/>
                 </a:solidFill>
                 <a:latin typeface="Trebuchet MS"/>
                 <a:cs typeface="Trebuchet MS"/>
               </a:rPr>
-              <a:t>(if </a:t>
-            </a:r>
-            <a:r>
-              <a:rPr sz="2400" spc="-65" dirty="0">
+              <a:t>mass &gt; </a:t>
+            </a:r>
+            <a:r>
+              <a:rPr sz="2400" spc="-125" dirty="0">
                 <a:solidFill>
                   <a:srgbClr val="2E75B6"/>
                 </a:solidFill>
                 <a:latin typeface="Trebuchet MS"/>
                 <a:cs typeface="Trebuchet MS"/>
               </a:rPr>
-              <a:t>mass &gt; </a:t>
-            </a:r>
-            <a:r>
-              <a:rPr sz="2400" spc="-125" dirty="0">
+              <a:t>3.2</a:t>
+            </a:r>
+            <a:r>
+              <a:rPr sz="2400" spc="-509" dirty="0">
                 <a:solidFill>
                   <a:srgbClr val="2E75B6"/>
                 </a:solidFill>
                 <a:latin typeface="Trebuchet MS"/>
                 <a:cs typeface="Trebuchet MS"/>
               </a:rPr>
-              <a:t>3.2</a:t>
-            </a:r>
-            <a:r>
-              <a:rPr sz="2400" spc="-509" dirty="0">
+              <a:t> </a:t>
+            </a:r>
+            <a:r>
+              <a:rPr sz="2400" spc="-204" dirty="0">
                 <a:solidFill>
                   <a:srgbClr val="2E75B6"/>
                 </a:solidFill>
                 <a:latin typeface="Trebuchet MS"/>
                 <a:cs typeface="Trebuchet MS"/>
               </a:rPr>
-              <a:t> </a:t>
-            </a:r>
-            <a:r>
-              <a:rPr sz="2400" spc="-204" dirty="0">
-                <a:solidFill>
-                  <a:srgbClr val="2E75B6"/>
-                </a:solidFill>
-                <a:latin typeface="Trebuchet MS"/>
-                <a:cs typeface="Trebuchet MS"/>
-              </a:rPr>
-              <a:t>):</a:t>
+              <a:t>:</a:t>
             </a:r>
             <a:endParaRPr sz="2400" dirty="0">
               <a:latin typeface="Trebuchet MS"/>

</xml_diff>